<commit_message>
Updated intro slides and fixed typo in lab.
</commit_message>
<xml_diff>
--- a/Content/Introduction/Training Introduction.pptx
+++ b/Content/Introduction/Training Introduction.pptx
@@ -5,17 +5,15 @@
     <p:sldMasterId id="2147483680" r:id="rId1"/>
   </p:sldMasterIdLst>
   <p:notesMasterIdLst>
-    <p:notesMasterId r:id="rId10"/>
+    <p:notesMasterId r:id="rId8"/>
   </p:notesMasterIdLst>
   <p:sldIdLst>
     <p:sldId id="256" r:id="rId2"/>
-    <p:sldId id="258" r:id="rId3"/>
-    <p:sldId id="257" r:id="rId4"/>
-    <p:sldId id="259" r:id="rId5"/>
-    <p:sldId id="260" r:id="rId6"/>
-    <p:sldId id="261" r:id="rId7"/>
-    <p:sldId id="262" r:id="rId8"/>
-    <p:sldId id="263" r:id="rId9"/>
+    <p:sldId id="257" r:id="rId3"/>
+    <p:sldId id="259" r:id="rId4"/>
+    <p:sldId id="260" r:id="rId5"/>
+    <p:sldId id="261" r:id="rId6"/>
+    <p:sldId id="263" r:id="rId7"/>
   </p:sldIdLst>
   <p:sldSz cx="12192000" cy="6858000"/>
   <p:notesSz cx="6858000" cy="9144000"/>
@@ -204,7 +202,7 @@
           <a:p>
             <a:fld id="{2E5CA586-3557-4985-BCD4-35EF5AC8B4A4}" type="datetimeFigureOut">
               <a:rPr lang="en-US" smtClean="0"/>
-              <a:t>9/13/15</a:t>
+              <a:t>10/1/15</a:t>
             </a:fld>
             <a:endParaRPr lang="en-US"/>
           </a:p>
@@ -11367,10 +11365,99 @@
           <a:chExt cx="0" cy="0"/>
         </a:xfrm>
       </p:grpSpPr>
+      <p:sp>
+        <p:nvSpPr>
+          <p:cNvPr id="2" name="Title 1"/>
+          <p:cNvSpPr>
+            <a:spLocks noGrp="1"/>
+          </p:cNvSpPr>
+          <p:nvPr>
+            <p:ph type="title"/>
+          </p:nvPr>
+        </p:nvSpPr>
+        <p:spPr/>
+        <p:txBody>
+          <a:bodyPr/>
+          <a:lstStyle/>
+          <a:p>
+            <a:r>
+              <a:rPr lang="en-US" dirty="0" smtClean="0"/>
+              <a:t>Microsoft Azure for Research</a:t>
+            </a:r>
+            <a:endParaRPr lang="en-US" dirty="0"/>
+          </a:p>
+        </p:txBody>
+      </p:sp>
+      <p:sp>
+        <p:nvSpPr>
+          <p:cNvPr id="3" name="Content Placeholder 2"/>
+          <p:cNvSpPr>
+            <a:spLocks noGrp="1"/>
+          </p:cNvSpPr>
+          <p:nvPr>
+            <p:ph idx="1"/>
+          </p:nvPr>
+        </p:nvSpPr>
+        <p:spPr>
+          <a:xfrm>
+            <a:off x="519248" y="1447800"/>
+            <a:ext cx="11151916" cy="3796937"/>
+          </a:xfrm>
+        </p:spPr>
+        <p:txBody>
+          <a:bodyPr/>
+          <a:lstStyle/>
+          <a:p>
+            <a:r>
+              <a:rPr lang="en-US" dirty="0" smtClean="0"/>
+              <a:t>Key learning objects for this class</a:t>
+            </a:r>
+          </a:p>
+          <a:p>
+            <a:pPr lvl="1"/>
+            <a:r>
+              <a:rPr lang="en-US" dirty="0" smtClean="0"/>
+              <a:t>A solid understanding of cloud computing</a:t>
+            </a:r>
+          </a:p>
+          <a:p>
+            <a:pPr lvl="1"/>
+            <a:r>
+              <a:rPr lang="en-US" dirty="0" smtClean="0"/>
+              <a:t>Why and when you would use it in scientific or other research</a:t>
+            </a:r>
+          </a:p>
+          <a:p>
+            <a:pPr lvl="1"/>
+            <a:r>
+              <a:rPr lang="en-US" dirty="0" smtClean="0"/>
+              <a:t>Hands-on experience with major parts of the service</a:t>
+            </a:r>
+          </a:p>
+          <a:p>
+            <a:pPr lvl="1"/>
+            <a:r>
+              <a:rPr lang="en-US" dirty="0" smtClean="0"/>
+              <a:t>Skills to run your own applications/services on Microsoft Azure</a:t>
+            </a:r>
+          </a:p>
+          <a:p>
+            <a:pPr lvl="1"/>
+            <a:endParaRPr lang="en-US" dirty="0"/>
+          </a:p>
+          <a:p>
+            <a:r>
+              <a:rPr lang="en-US" dirty="0" smtClean="0"/>
+              <a:t>Ultimately: Researchers feel confident in applying cloud computing in their current and future research</a:t>
+            </a:r>
+            <a:endParaRPr lang="en-US" dirty="0"/>
+          </a:p>
+        </p:txBody>
+      </p:sp>
     </p:spTree>
     <p:extLst>
       <p:ext uri="{BB962C8B-B14F-4D97-AF65-F5344CB8AC3E}">
-        <p14:creationId xmlns:p14="http://schemas.microsoft.com/office/powerpoint/2010/main" val="1325593875"/>
+        <p14:creationId xmlns:p14="http://schemas.microsoft.com/office/powerpoint/2010/main" val="123269378"/>
       </p:ext>
     </p:extLst>
   </p:cSld>
@@ -11410,128 +11497,6 @@
             <p:ph type="title"/>
           </p:nvPr>
         </p:nvSpPr>
-        <p:spPr/>
-        <p:txBody>
-          <a:bodyPr/>
-          <a:lstStyle/>
-          <a:p>
-            <a:r>
-              <a:rPr lang="en-US" dirty="0" smtClean="0"/>
-              <a:t>Microsoft Azure for Research</a:t>
-            </a:r>
-            <a:endParaRPr lang="en-US" dirty="0"/>
-          </a:p>
-        </p:txBody>
-      </p:sp>
-      <p:sp>
-        <p:nvSpPr>
-          <p:cNvPr id="3" name="Content Placeholder 2"/>
-          <p:cNvSpPr>
-            <a:spLocks noGrp="1"/>
-          </p:cNvSpPr>
-          <p:nvPr>
-            <p:ph idx="1"/>
-          </p:nvPr>
-        </p:nvSpPr>
-        <p:spPr>
-          <a:xfrm>
-            <a:off x="519248" y="1447800"/>
-            <a:ext cx="11151916" cy="3796937"/>
-          </a:xfrm>
-        </p:spPr>
-        <p:txBody>
-          <a:bodyPr/>
-          <a:lstStyle/>
-          <a:p>
-            <a:r>
-              <a:rPr lang="en-US" dirty="0" smtClean="0"/>
-              <a:t>Key learning objects for this class</a:t>
-            </a:r>
-          </a:p>
-          <a:p>
-            <a:pPr lvl="1"/>
-            <a:r>
-              <a:rPr lang="en-US" dirty="0" smtClean="0"/>
-              <a:t>A solid understanding of cloud computing</a:t>
-            </a:r>
-          </a:p>
-          <a:p>
-            <a:pPr lvl="1"/>
-            <a:r>
-              <a:rPr lang="en-US" dirty="0" smtClean="0"/>
-              <a:t>Why and when you would use it in scientific or other research</a:t>
-            </a:r>
-          </a:p>
-          <a:p>
-            <a:pPr lvl="1"/>
-            <a:r>
-              <a:rPr lang="en-US" dirty="0" smtClean="0"/>
-              <a:t>Hands-on experience with major parts of the service</a:t>
-            </a:r>
-          </a:p>
-          <a:p>
-            <a:pPr lvl="1"/>
-            <a:r>
-              <a:rPr lang="en-US" dirty="0" smtClean="0"/>
-              <a:t>Skills to run your own applications/services on Microsoft Azure</a:t>
-            </a:r>
-          </a:p>
-          <a:p>
-            <a:pPr lvl="1"/>
-            <a:endParaRPr lang="en-US" dirty="0"/>
-          </a:p>
-          <a:p>
-            <a:r>
-              <a:rPr lang="en-US" dirty="0" smtClean="0"/>
-              <a:t>Ultimately: Researchers feel confident in applying cloud computing in their current and future research</a:t>
-            </a:r>
-            <a:endParaRPr lang="en-US" dirty="0"/>
-          </a:p>
-        </p:txBody>
-      </p:sp>
-    </p:spTree>
-    <p:extLst>
-      <p:ext uri="{BB962C8B-B14F-4D97-AF65-F5344CB8AC3E}">
-        <p14:creationId xmlns:p14="http://schemas.microsoft.com/office/powerpoint/2010/main" val="123269378"/>
-      </p:ext>
-    </p:extLst>
-  </p:cSld>
-  <p:clrMapOvr>
-    <a:masterClrMapping/>
-  </p:clrMapOvr>
-  <p:transition>
-    <p:fade/>
-  </p:transition>
-</p:sld>
-</file>
-
-<file path=ppt/slides/slide4.xml><?xml version="1.0" encoding="utf-8"?>
-<p:sld xmlns:a="http://schemas.openxmlformats.org/drawingml/2006/main" xmlns:r="http://schemas.openxmlformats.org/officeDocument/2006/relationships" xmlns:p="http://schemas.openxmlformats.org/presentationml/2006/main">
-  <p:cSld>
-    <p:spTree>
-      <p:nvGrpSpPr>
-        <p:cNvPr id="1" name=""/>
-        <p:cNvGrpSpPr/>
-        <p:nvPr/>
-      </p:nvGrpSpPr>
-      <p:grpSpPr>
-        <a:xfrm>
-          <a:off x="0" y="0"/>
-          <a:ext cx="0" cy="0"/>
-          <a:chOff x="0" y="0"/>
-          <a:chExt cx="0" cy="0"/>
-        </a:xfrm>
-      </p:grpSpPr>
-      <p:sp>
-        <p:nvSpPr>
-          <p:cNvPr id="2" name="Title 1"/>
-          <p:cNvSpPr>
-            <a:spLocks noGrp="1"/>
-          </p:cNvSpPr>
-          <p:nvPr>
-            <p:ph type="title"/>
-          </p:nvPr>
-        </p:nvSpPr>
         <p:spPr>
           <a:xfrm>
             <a:off x="519249" y="228603"/>
@@ -11577,32 +11542,35 @@
           </a:p>
           <a:p>
             <a:r>
+              <a:rPr lang="en-US" sz="2800" dirty="0"/>
+              <a:t>Azure Machine Learning</a:t>
+            </a:r>
+          </a:p>
+          <a:p>
+            <a:r>
               <a:rPr lang="en-US" sz="2800" dirty="0" smtClean="0"/>
-              <a:t>Azure Storage and Azure Cross Platform Tools</a:t>
-            </a:r>
-          </a:p>
-          <a:p>
+              <a:t>Azure </a:t>
+            </a:r>
             <a:r>
               <a:rPr lang="en-US" sz="2800" dirty="0" smtClean="0"/>
-              <a:t>Azure Machine Learning</a:t>
+              <a:t>Storage and Azure Cross Platform Tools</a:t>
             </a:r>
           </a:p>
           <a:p>
             <a:r>
               <a:rPr lang="en-US" sz="2800" dirty="0" smtClean="0"/>
-              <a:t>Azure Internet of Things using Steam Analytics</a:t>
-            </a:r>
-          </a:p>
-          <a:p>
+              <a:t>Azure </a:t>
+            </a:r>
             <a:r>
               <a:rPr lang="en-US" sz="2800" dirty="0" smtClean="0"/>
-              <a:t>Big Data Analytics with  </a:t>
-            </a:r>
-            <a:r>
-              <a:rPr lang="en-US" sz="2800" smtClean="0"/>
-              <a:t>HDInsight</a:t>
-            </a:r>
-            <a:endParaRPr lang="en-US" sz="2800" dirty="0" smtClean="0"/>
+              <a:t>Internet of Things using Steam Analytics</a:t>
+            </a:r>
+          </a:p>
+          <a:p>
+            <a:r>
+              <a:rPr lang="en-US" sz="2800" dirty="0" smtClean="0"/>
+              <a:t>Big Data Analytics with  HDInsight</a:t>
+            </a:r>
           </a:p>
           <a:p>
             <a:r>
@@ -11860,6 +11828,128 @@
 </p:sld>
 </file>
 
+<file path=ppt/slides/slide4.xml><?xml version="1.0" encoding="utf-8"?>
+<p:sld xmlns:a="http://schemas.openxmlformats.org/drawingml/2006/main" xmlns:r="http://schemas.openxmlformats.org/officeDocument/2006/relationships" xmlns:p="http://schemas.openxmlformats.org/presentationml/2006/main">
+  <p:cSld>
+    <p:spTree>
+      <p:nvGrpSpPr>
+        <p:cNvPr id="1" name=""/>
+        <p:cNvGrpSpPr/>
+        <p:nvPr/>
+      </p:nvGrpSpPr>
+      <p:grpSpPr>
+        <a:xfrm>
+          <a:off x="0" y="0"/>
+          <a:ext cx="0" cy="0"/>
+          <a:chOff x="0" y="0"/>
+          <a:chExt cx="0" cy="0"/>
+        </a:xfrm>
+      </p:grpSpPr>
+      <p:sp>
+        <p:nvSpPr>
+          <p:cNvPr id="2" name="Title 1"/>
+          <p:cNvSpPr>
+            <a:spLocks noGrp="1"/>
+          </p:cNvSpPr>
+          <p:nvPr>
+            <p:ph type="title"/>
+          </p:nvPr>
+        </p:nvSpPr>
+        <p:spPr/>
+        <p:txBody>
+          <a:bodyPr/>
+          <a:lstStyle/>
+          <a:p>
+            <a:r>
+              <a:rPr lang="en-US" dirty="0" smtClean="0"/>
+              <a:t>Azure Training Pass</a:t>
+            </a:r>
+            <a:endParaRPr lang="en-US" dirty="0"/>
+          </a:p>
+        </p:txBody>
+      </p:sp>
+      <p:sp>
+        <p:nvSpPr>
+          <p:cNvPr id="3" name="Content Placeholder 2"/>
+          <p:cNvSpPr>
+            <a:spLocks noGrp="1"/>
+          </p:cNvSpPr>
+          <p:nvPr>
+            <p:ph idx="1"/>
+          </p:nvPr>
+        </p:nvSpPr>
+        <p:spPr>
+          <a:xfrm>
+            <a:off x="519248" y="1447800"/>
+            <a:ext cx="11151916" cy="2541593"/>
+          </a:xfrm>
+        </p:spPr>
+        <p:txBody>
+          <a:bodyPr/>
+          <a:lstStyle/>
+          <a:p>
+            <a:r>
+              <a:rPr lang="en-US" dirty="0" smtClean="0"/>
+              <a:t>Each of you received a free promo code</a:t>
+            </a:r>
+          </a:p>
+          <a:p>
+            <a:pPr lvl="1"/>
+            <a:r>
+              <a:rPr lang="en-US" dirty="0" smtClean="0"/>
+              <a:t>Does not require a credit card!</a:t>
+            </a:r>
+          </a:p>
+          <a:p>
+            <a:r>
+              <a:rPr lang="en-US" dirty="0" smtClean="0"/>
+              <a:t>Good for $500 Azure credit for one month</a:t>
+            </a:r>
+          </a:p>
+          <a:p>
+            <a:r>
+              <a:rPr lang="en-US" dirty="0" smtClean="0"/>
+              <a:t>Requires a </a:t>
+            </a:r>
+            <a:r>
+              <a:rPr lang="en-US" dirty="0" smtClean="0"/>
+              <a:t>brand new </a:t>
+            </a:r>
+            <a:r>
+              <a:rPr lang="en-US" dirty="0" smtClean="0"/>
+              <a:t>Microsoft </a:t>
+            </a:r>
+            <a:r>
+              <a:rPr lang="en-US" dirty="0" smtClean="0"/>
+              <a:t>Account</a:t>
+            </a:r>
+          </a:p>
+          <a:p>
+            <a:pPr lvl="1"/>
+            <a:r>
+              <a:rPr lang="en-US" dirty="0" smtClean="0"/>
+              <a:t>You will create one as part of the first lab</a:t>
+            </a:r>
+            <a:endParaRPr lang="en-US" dirty="0" smtClean="0"/>
+          </a:p>
+        </p:txBody>
+      </p:sp>
+    </p:spTree>
+    <p:extLst>
+      <p:ext uri="{BB962C8B-B14F-4D97-AF65-F5344CB8AC3E}">
+        <p14:creationId xmlns:p14="http://schemas.microsoft.com/office/powerpoint/2010/main" val="810300279"/>
+      </p:ext>
+    </p:extLst>
+  </p:cSld>
+  <p:clrMapOvr>
+    <a:masterClrMapping/>
+  </p:clrMapOvr>
+  <p:transition>
+    <p:fade/>
+  </p:transition>
+</p:sld>
+</file>
+
 <file path=ppt/slides/slide5.xml><?xml version="1.0" encoding="utf-8"?>
 <p:sld xmlns:a="http://schemas.openxmlformats.org/drawingml/2006/main" xmlns:r="http://schemas.openxmlformats.org/officeDocument/2006/relationships" xmlns:p="http://schemas.openxmlformats.org/presentationml/2006/main">
   <p:cSld>
@@ -11894,130 +11984,6 @@
           <a:p>
             <a:r>
               <a:rPr lang="en-US" dirty="0" smtClean="0"/>
-              <a:t>Azure Training Pass</a:t>
-            </a:r>
-            <a:endParaRPr lang="en-US" dirty="0"/>
-          </a:p>
-        </p:txBody>
-      </p:sp>
-      <p:sp>
-        <p:nvSpPr>
-          <p:cNvPr id="3" name="Content Placeholder 2"/>
-          <p:cNvSpPr>
-            <a:spLocks noGrp="1"/>
-          </p:cNvSpPr>
-          <p:nvPr>
-            <p:ph idx="1"/>
-          </p:nvPr>
-        </p:nvSpPr>
-        <p:spPr>
-          <a:xfrm>
-            <a:off x="519248" y="1447800"/>
-            <a:ext cx="11151916" cy="3286156"/>
-          </a:xfrm>
-        </p:spPr>
-        <p:txBody>
-          <a:bodyPr/>
-          <a:lstStyle/>
-          <a:p>
-            <a:r>
-              <a:rPr lang="en-US" dirty="0" smtClean="0"/>
-              <a:t>Each of you received a free promo code</a:t>
-            </a:r>
-          </a:p>
-          <a:p>
-            <a:pPr lvl="1"/>
-            <a:r>
-              <a:rPr lang="en-US" dirty="0" smtClean="0"/>
-              <a:t>Does not require a credit card!</a:t>
-            </a:r>
-          </a:p>
-          <a:p>
-            <a:r>
-              <a:rPr lang="en-US" dirty="0" smtClean="0"/>
-              <a:t>Good for $500 Azure credit for one month</a:t>
-            </a:r>
-          </a:p>
-          <a:p>
-            <a:r>
-              <a:rPr lang="en-US" dirty="0" smtClean="0"/>
-              <a:t>Requires a pure Microsoft Account</a:t>
-            </a:r>
-          </a:p>
-          <a:p>
-            <a:pPr lvl="1"/>
-            <a:r>
-              <a:rPr lang="en-US" dirty="0" smtClean="0"/>
-              <a:t>Does school/organization use Office 365 or Office 365 for EDU?</a:t>
-            </a:r>
-          </a:p>
-          <a:p>
-            <a:pPr lvl="2"/>
-            <a:r>
-              <a:rPr lang="en-US" dirty="0" smtClean="0"/>
-              <a:t>Do not use your school/organization email address as user ID</a:t>
-            </a:r>
-          </a:p>
-          <a:p>
-            <a:pPr lvl="2"/>
-            <a:r>
-              <a:rPr lang="en-US" dirty="0" smtClean="0"/>
-              <a:t>Create a new one</a:t>
-            </a:r>
-            <a:endParaRPr lang="en-US" dirty="0"/>
-          </a:p>
-        </p:txBody>
-      </p:sp>
-    </p:spTree>
-    <p:extLst>
-      <p:ext uri="{BB962C8B-B14F-4D97-AF65-F5344CB8AC3E}">
-        <p14:creationId xmlns:p14="http://schemas.microsoft.com/office/powerpoint/2010/main" val="810300279"/>
-      </p:ext>
-    </p:extLst>
-  </p:cSld>
-  <p:clrMapOvr>
-    <a:masterClrMapping/>
-  </p:clrMapOvr>
-  <p:transition>
-    <p:fade/>
-  </p:transition>
-</p:sld>
-</file>
-
-<file path=ppt/slides/slide6.xml><?xml version="1.0" encoding="utf-8"?>
-<p:sld xmlns:a="http://schemas.openxmlformats.org/drawingml/2006/main" xmlns:r="http://schemas.openxmlformats.org/officeDocument/2006/relationships" xmlns:p="http://schemas.openxmlformats.org/presentationml/2006/main">
-  <p:cSld>
-    <p:spTree>
-      <p:nvGrpSpPr>
-        <p:cNvPr id="1" name=""/>
-        <p:cNvGrpSpPr/>
-        <p:nvPr/>
-      </p:nvGrpSpPr>
-      <p:grpSpPr>
-        <a:xfrm>
-          <a:off x="0" y="0"/>
-          <a:ext cx="0" cy="0"/>
-          <a:chOff x="0" y="0"/>
-          <a:chExt cx="0" cy="0"/>
-        </a:xfrm>
-      </p:grpSpPr>
-      <p:sp>
-        <p:nvSpPr>
-          <p:cNvPr id="2" name="Title 1"/>
-          <p:cNvSpPr>
-            <a:spLocks noGrp="1"/>
-          </p:cNvSpPr>
-          <p:nvPr>
-            <p:ph type="title"/>
-          </p:nvPr>
-        </p:nvSpPr>
-        <p:spPr/>
-        <p:txBody>
-          <a:bodyPr/>
-          <a:lstStyle/>
-          <a:p>
-            <a:r>
-              <a:rPr lang="en-US" dirty="0" smtClean="0"/>
               <a:t>Course Content Layout</a:t>
             </a:r>
             <a:endParaRPr lang="en-US" dirty="0"/>
@@ -12133,78 +12099,7 @@
 </p:sld>
 </file>
 
-<file path=ppt/slides/slide7.xml><?xml version="1.0" encoding="utf-8"?>
-<p:sld xmlns:a="http://schemas.openxmlformats.org/drawingml/2006/main" xmlns:r="http://schemas.openxmlformats.org/officeDocument/2006/relationships" xmlns:p="http://schemas.openxmlformats.org/presentationml/2006/main">
-  <p:cSld>
-    <p:spTree>
-      <p:nvGrpSpPr>
-        <p:cNvPr id="1" name=""/>
-        <p:cNvGrpSpPr/>
-        <p:nvPr/>
-      </p:nvGrpSpPr>
-      <p:grpSpPr>
-        <a:xfrm>
-          <a:off x="0" y="0"/>
-          <a:ext cx="0" cy="0"/>
-          <a:chOff x="0" y="0"/>
-          <a:chExt cx="0" cy="0"/>
-        </a:xfrm>
-      </p:grpSpPr>
-      <p:sp>
-        <p:nvSpPr>
-          <p:cNvPr id="2" name="Title 1"/>
-          <p:cNvSpPr>
-            <a:spLocks noGrp="1"/>
-          </p:cNvSpPr>
-          <p:nvPr>
-            <p:ph type="title"/>
-          </p:nvPr>
-        </p:nvSpPr>
-        <p:spPr/>
-        <p:txBody>
-          <a:bodyPr/>
-          <a:lstStyle/>
-          <a:p>
-            <a:endParaRPr lang="en-US" dirty="0"/>
-          </a:p>
-        </p:txBody>
-      </p:sp>
-      <p:sp>
-        <p:nvSpPr>
-          <p:cNvPr id="3" name="Content Placeholder 2"/>
-          <p:cNvSpPr>
-            <a:spLocks noGrp="1"/>
-          </p:cNvSpPr>
-          <p:nvPr>
-            <p:ph idx="1"/>
-          </p:nvPr>
-        </p:nvSpPr>
-        <p:spPr/>
-        <p:txBody>
-          <a:bodyPr/>
-          <a:lstStyle/>
-          <a:p>
-            <a:endParaRPr lang="en-US"/>
-          </a:p>
-        </p:txBody>
-      </p:sp>
-    </p:spTree>
-    <p:extLst>
-      <p:ext uri="{BB962C8B-B14F-4D97-AF65-F5344CB8AC3E}">
-        <p14:creationId xmlns:p14="http://schemas.microsoft.com/office/powerpoint/2010/main" val="502651186"/>
-      </p:ext>
-    </p:extLst>
-  </p:cSld>
-  <p:clrMapOvr>
-    <a:masterClrMapping/>
-  </p:clrMapOvr>
-  <p:transition>
-    <p:fade/>
-  </p:transition>
-</p:sld>
-</file>
-
-<file path=ppt/slides/slide8.xml><?xml version="1.0" encoding="utf-8"?>
+<file path=ppt/slides/slide6.xml><?xml version="1.0" encoding="utf-8"?>
 <p:sld xmlns:a="http://schemas.openxmlformats.org/drawingml/2006/main" xmlns:r="http://schemas.openxmlformats.org/officeDocument/2006/relationships" xmlns:p="http://schemas.openxmlformats.org/presentationml/2006/main">
   <p:cSld>
     <p:spTree>

</xml_diff>